<commit_message>
Added final Tutorial Page
</commit_message>
<xml_diff>
--- a/ArtWork/Tutorial Pages/ppt/Screens.pptx
+++ b/ArtWork/Tutorial Pages/ppt/Screens.pptx
@@ -1,12 +1,13 @@
 
 <file path=ppt/presentation.xml><?xml version="1.0" encoding="utf-8"?>
-<p:presentation xmlns:a="http://schemas.openxmlformats.org/drawingml/2006/main" xmlns:r="http://schemas.openxmlformats.org/officeDocument/2006/relationships" xmlns:p="http://schemas.openxmlformats.org/presentationml/2006/main" saveSubsetFonts="1" autoCompressPictures="0">
+<p:presentation xmlns:a="http://schemas.openxmlformats.org/drawingml/2006/main" xmlns:r="http://schemas.openxmlformats.org/officeDocument/2006/relationships" xmlns:mc="http://schemas.openxmlformats.org/markup-compatibility/2006" xmlns:mv="urn:schemas-microsoft-com:mac:vml" xmlns:p="http://schemas.openxmlformats.org/presentationml/2006/main" mc:Ignorable="mv" mc:PreserveAttributes="mv:*" saveSubsetFonts="1" autoCompressPictures="0">
   <p:sldMasterIdLst>
     <p:sldMasterId id="2147483648" r:id="rId1"/>
   </p:sldMasterIdLst>
   <p:sldIdLst>
     <p:sldId id="256" r:id="rId2"/>
     <p:sldId id="257" r:id="rId3"/>
+    <p:sldId id="258" r:id="rId4"/>
   </p:sldIdLst>
   <p:sldSz cx="9144000" cy="6858000" type="screen4x3"/>
   <p:notesSz cx="6858000" cy="9144000"/>
@@ -109,7 +110,7 @@
 </file>
 
 <file path=ppt/slideLayouts/slideLayout1.xml><?xml version="1.0" encoding="utf-8"?>
-<p:sldLayout xmlns:a="http://schemas.openxmlformats.org/drawingml/2006/main" xmlns:r="http://schemas.openxmlformats.org/officeDocument/2006/relationships" xmlns:p="http://schemas.openxmlformats.org/presentationml/2006/main" type="title" preserve="1">
+<p:sldLayout xmlns:a="http://schemas.openxmlformats.org/drawingml/2006/main" xmlns:r="http://schemas.openxmlformats.org/officeDocument/2006/relationships" xmlns:mc="http://schemas.openxmlformats.org/markup-compatibility/2006" xmlns:mv="urn:schemas-microsoft-com:mac:vml" xmlns:p="http://schemas.openxmlformats.org/presentationml/2006/main" mc:Ignorable="mv" mc:PreserveAttributes="mv:*" type="title" preserve="1">
   <p:cSld name="Title Slide">
     <p:spTree>
       <p:nvGrpSpPr>
@@ -289,7 +290,8 @@
           <a:p>
             <a:fld id="{9AE6FFD7-07CB-4A48-9462-C98F98C8ABDE}" type="datetimeFigureOut">
               <a:rPr lang="en-US" smtClean="0"/>
-              <a:t>11/21/13</a:t>
+              <a:pPr/>
+              <a:t>12/12/13</a:t>
             </a:fld>
             <a:endParaRPr lang="en-US"/>
           </a:p>
@@ -331,6 +333,7 @@
           <a:p>
             <a:fld id="{E311C8D0-B88E-954A-8276-0656B5CE616B}" type="slidenum">
               <a:rPr lang="en-US" smtClean="0"/>
+              <a:pPr/>
               <a:t>‹#›</a:t>
             </a:fld>
             <a:endParaRPr lang="en-US"/>
@@ -340,7 +343,7 @@
     </p:spTree>
     <p:extLst>
       <p:ext uri="{BB962C8B-B14F-4D97-AF65-F5344CB8AC3E}">
-        <p14:creationId xmlns:p14="http://schemas.microsoft.com/office/powerpoint/2010/main" val="3058531221"/>
+        <p14:creationId xmlns:p14="http://schemas.microsoft.com/office/powerpoint/2010/main" xmlns:p="http://schemas.openxmlformats.org/presentationml/2006/main" xmlns:r="http://schemas.openxmlformats.org/officeDocument/2006/relationships" xmlns:a="http://schemas.openxmlformats.org/drawingml/2006/main" xmlns="" val="3058531221"/>
       </p:ext>
     </p:extLst>
   </p:cSld>
@@ -351,7 +354,7 @@
 </file>
 
 <file path=ppt/slideLayouts/slideLayout10.xml><?xml version="1.0" encoding="utf-8"?>
-<p:sldLayout xmlns:a="http://schemas.openxmlformats.org/drawingml/2006/main" xmlns:r="http://schemas.openxmlformats.org/officeDocument/2006/relationships" xmlns:p="http://schemas.openxmlformats.org/presentationml/2006/main" type="vertTx" preserve="1">
+<p:sldLayout xmlns:a="http://schemas.openxmlformats.org/drawingml/2006/main" xmlns:r="http://schemas.openxmlformats.org/officeDocument/2006/relationships" xmlns:mc="http://schemas.openxmlformats.org/markup-compatibility/2006" xmlns:mv="urn:schemas-microsoft-com:mac:vml" xmlns:p="http://schemas.openxmlformats.org/presentationml/2006/main" mc:Ignorable="mv" mc:PreserveAttributes="mv:*" type="vertTx" preserve="1">
   <p:cSld name="Title and Vertical Text">
     <p:spTree>
       <p:nvGrpSpPr>
@@ -459,7 +462,8 @@
           <a:p>
             <a:fld id="{9AE6FFD7-07CB-4A48-9462-C98F98C8ABDE}" type="datetimeFigureOut">
               <a:rPr lang="en-US" smtClean="0"/>
-              <a:t>11/21/13</a:t>
+              <a:pPr/>
+              <a:t>12/12/13</a:t>
             </a:fld>
             <a:endParaRPr lang="en-US"/>
           </a:p>
@@ -501,6 +505,7 @@
           <a:p>
             <a:fld id="{E311C8D0-B88E-954A-8276-0656B5CE616B}" type="slidenum">
               <a:rPr lang="en-US" smtClean="0"/>
+              <a:pPr/>
               <a:t>‹#›</a:t>
             </a:fld>
             <a:endParaRPr lang="en-US"/>
@@ -510,7 +515,7 @@
     </p:spTree>
     <p:extLst>
       <p:ext uri="{BB962C8B-B14F-4D97-AF65-F5344CB8AC3E}">
-        <p14:creationId xmlns:p14="http://schemas.microsoft.com/office/powerpoint/2010/main" val="3511311532"/>
+        <p14:creationId xmlns:p14="http://schemas.microsoft.com/office/powerpoint/2010/main" xmlns:p="http://schemas.openxmlformats.org/presentationml/2006/main" xmlns:r="http://schemas.openxmlformats.org/officeDocument/2006/relationships" xmlns:a="http://schemas.openxmlformats.org/drawingml/2006/main" xmlns="" val="3511311532"/>
       </p:ext>
     </p:extLst>
   </p:cSld>
@@ -521,7 +526,7 @@
 </file>
 
 <file path=ppt/slideLayouts/slideLayout11.xml><?xml version="1.0" encoding="utf-8"?>
-<p:sldLayout xmlns:a="http://schemas.openxmlformats.org/drawingml/2006/main" xmlns:r="http://schemas.openxmlformats.org/officeDocument/2006/relationships" xmlns:p="http://schemas.openxmlformats.org/presentationml/2006/main" type="vertTitleAndTx" preserve="1">
+<p:sldLayout xmlns:a="http://schemas.openxmlformats.org/drawingml/2006/main" xmlns:r="http://schemas.openxmlformats.org/officeDocument/2006/relationships" xmlns:mc="http://schemas.openxmlformats.org/markup-compatibility/2006" xmlns:mv="urn:schemas-microsoft-com:mac:vml" xmlns:p="http://schemas.openxmlformats.org/presentationml/2006/main" mc:Ignorable="mv" mc:PreserveAttributes="mv:*" type="vertTitleAndTx" preserve="1">
   <p:cSld name="Vertical Title and Text">
     <p:spTree>
       <p:nvGrpSpPr>
@@ -639,7 +644,8 @@
           <a:p>
             <a:fld id="{9AE6FFD7-07CB-4A48-9462-C98F98C8ABDE}" type="datetimeFigureOut">
               <a:rPr lang="en-US" smtClean="0"/>
-              <a:t>11/21/13</a:t>
+              <a:pPr/>
+              <a:t>12/12/13</a:t>
             </a:fld>
             <a:endParaRPr lang="en-US"/>
           </a:p>
@@ -681,6 +687,7 @@
           <a:p>
             <a:fld id="{E311C8D0-B88E-954A-8276-0656B5CE616B}" type="slidenum">
               <a:rPr lang="en-US" smtClean="0"/>
+              <a:pPr/>
               <a:t>‹#›</a:t>
             </a:fld>
             <a:endParaRPr lang="en-US"/>
@@ -690,7 +697,7 @@
     </p:spTree>
     <p:extLst>
       <p:ext uri="{BB962C8B-B14F-4D97-AF65-F5344CB8AC3E}">
-        <p14:creationId xmlns:p14="http://schemas.microsoft.com/office/powerpoint/2010/main" val="2474050226"/>
+        <p14:creationId xmlns:p14="http://schemas.microsoft.com/office/powerpoint/2010/main" xmlns:p="http://schemas.openxmlformats.org/presentationml/2006/main" xmlns:r="http://schemas.openxmlformats.org/officeDocument/2006/relationships" xmlns:a="http://schemas.openxmlformats.org/drawingml/2006/main" xmlns="" val="2474050226"/>
       </p:ext>
     </p:extLst>
   </p:cSld>
@@ -701,7 +708,7 @@
 </file>
 
 <file path=ppt/slideLayouts/slideLayout2.xml><?xml version="1.0" encoding="utf-8"?>
-<p:sldLayout xmlns:a="http://schemas.openxmlformats.org/drawingml/2006/main" xmlns:r="http://schemas.openxmlformats.org/officeDocument/2006/relationships" xmlns:p="http://schemas.openxmlformats.org/presentationml/2006/main" type="obj" preserve="1">
+<p:sldLayout xmlns:a="http://schemas.openxmlformats.org/drawingml/2006/main" xmlns:r="http://schemas.openxmlformats.org/officeDocument/2006/relationships" xmlns:mc="http://schemas.openxmlformats.org/markup-compatibility/2006" xmlns:mv="urn:schemas-microsoft-com:mac:vml" xmlns:p="http://schemas.openxmlformats.org/presentationml/2006/main" mc:Ignorable="mv" mc:PreserveAttributes="mv:*" type="obj" preserve="1">
   <p:cSld name="Title and Content">
     <p:spTree>
       <p:nvGrpSpPr>
@@ -809,7 +816,8 @@
           <a:p>
             <a:fld id="{9AE6FFD7-07CB-4A48-9462-C98F98C8ABDE}" type="datetimeFigureOut">
               <a:rPr lang="en-US" smtClean="0"/>
-              <a:t>11/21/13</a:t>
+              <a:pPr/>
+              <a:t>12/12/13</a:t>
             </a:fld>
             <a:endParaRPr lang="en-US"/>
           </a:p>
@@ -851,6 +859,7 @@
           <a:p>
             <a:fld id="{E311C8D0-B88E-954A-8276-0656B5CE616B}" type="slidenum">
               <a:rPr lang="en-US" smtClean="0"/>
+              <a:pPr/>
               <a:t>‹#›</a:t>
             </a:fld>
             <a:endParaRPr lang="en-US"/>
@@ -860,7 +869,7 @@
     </p:spTree>
     <p:extLst>
       <p:ext uri="{BB962C8B-B14F-4D97-AF65-F5344CB8AC3E}">
-        <p14:creationId xmlns:p14="http://schemas.microsoft.com/office/powerpoint/2010/main" val="1028478103"/>
+        <p14:creationId xmlns:p14="http://schemas.microsoft.com/office/powerpoint/2010/main" xmlns:p="http://schemas.openxmlformats.org/presentationml/2006/main" xmlns:r="http://schemas.openxmlformats.org/officeDocument/2006/relationships" xmlns:a="http://schemas.openxmlformats.org/drawingml/2006/main" xmlns="" val="1028478103"/>
       </p:ext>
     </p:extLst>
   </p:cSld>
@@ -871,7 +880,7 @@
 </file>
 
 <file path=ppt/slideLayouts/slideLayout3.xml><?xml version="1.0" encoding="utf-8"?>
-<p:sldLayout xmlns:a="http://schemas.openxmlformats.org/drawingml/2006/main" xmlns:r="http://schemas.openxmlformats.org/officeDocument/2006/relationships" xmlns:p="http://schemas.openxmlformats.org/presentationml/2006/main" type="secHead" preserve="1">
+<p:sldLayout xmlns:a="http://schemas.openxmlformats.org/drawingml/2006/main" xmlns:r="http://schemas.openxmlformats.org/officeDocument/2006/relationships" xmlns:mc="http://schemas.openxmlformats.org/markup-compatibility/2006" xmlns:mv="urn:schemas-microsoft-com:mac:vml" xmlns:p="http://schemas.openxmlformats.org/presentationml/2006/main" mc:Ignorable="mv" mc:PreserveAttributes="mv:*" type="secHead" preserve="1">
   <p:cSld name="Section Header">
     <p:spTree>
       <p:nvGrpSpPr>
@@ -1055,7 +1064,8 @@
           <a:p>
             <a:fld id="{9AE6FFD7-07CB-4A48-9462-C98F98C8ABDE}" type="datetimeFigureOut">
               <a:rPr lang="en-US" smtClean="0"/>
-              <a:t>11/21/13</a:t>
+              <a:pPr/>
+              <a:t>12/12/13</a:t>
             </a:fld>
             <a:endParaRPr lang="en-US"/>
           </a:p>
@@ -1097,6 +1107,7 @@
           <a:p>
             <a:fld id="{E311C8D0-B88E-954A-8276-0656B5CE616B}" type="slidenum">
               <a:rPr lang="en-US" smtClean="0"/>
+              <a:pPr/>
               <a:t>‹#›</a:t>
             </a:fld>
             <a:endParaRPr lang="en-US"/>
@@ -1106,7 +1117,7 @@
     </p:spTree>
     <p:extLst>
       <p:ext uri="{BB962C8B-B14F-4D97-AF65-F5344CB8AC3E}">
-        <p14:creationId xmlns:p14="http://schemas.microsoft.com/office/powerpoint/2010/main" val="433093981"/>
+        <p14:creationId xmlns:p14="http://schemas.microsoft.com/office/powerpoint/2010/main" xmlns:p="http://schemas.openxmlformats.org/presentationml/2006/main" xmlns:r="http://schemas.openxmlformats.org/officeDocument/2006/relationships" xmlns:a="http://schemas.openxmlformats.org/drawingml/2006/main" xmlns="" val="433093981"/>
       </p:ext>
     </p:extLst>
   </p:cSld>
@@ -1117,7 +1128,7 @@
 </file>
 
 <file path=ppt/slideLayouts/slideLayout4.xml><?xml version="1.0" encoding="utf-8"?>
-<p:sldLayout xmlns:a="http://schemas.openxmlformats.org/drawingml/2006/main" xmlns:r="http://schemas.openxmlformats.org/officeDocument/2006/relationships" xmlns:p="http://schemas.openxmlformats.org/presentationml/2006/main" type="twoObj" preserve="1">
+<p:sldLayout xmlns:a="http://schemas.openxmlformats.org/drawingml/2006/main" xmlns:r="http://schemas.openxmlformats.org/officeDocument/2006/relationships" xmlns:mc="http://schemas.openxmlformats.org/markup-compatibility/2006" xmlns:mv="urn:schemas-microsoft-com:mac:vml" xmlns:p="http://schemas.openxmlformats.org/presentationml/2006/main" mc:Ignorable="mv" mc:PreserveAttributes="mv:*" type="twoObj" preserve="1">
   <p:cSld name="Two Content">
     <p:spTree>
       <p:nvGrpSpPr>
@@ -1343,7 +1354,8 @@
           <a:p>
             <a:fld id="{9AE6FFD7-07CB-4A48-9462-C98F98C8ABDE}" type="datetimeFigureOut">
               <a:rPr lang="en-US" smtClean="0"/>
-              <a:t>11/21/13</a:t>
+              <a:pPr/>
+              <a:t>12/12/13</a:t>
             </a:fld>
             <a:endParaRPr lang="en-US"/>
           </a:p>
@@ -1385,6 +1397,7 @@
           <a:p>
             <a:fld id="{E311C8D0-B88E-954A-8276-0656B5CE616B}" type="slidenum">
               <a:rPr lang="en-US" smtClean="0"/>
+              <a:pPr/>
               <a:t>‹#›</a:t>
             </a:fld>
             <a:endParaRPr lang="en-US"/>
@@ -1394,7 +1407,7 @@
     </p:spTree>
     <p:extLst>
       <p:ext uri="{BB962C8B-B14F-4D97-AF65-F5344CB8AC3E}">
-        <p14:creationId xmlns:p14="http://schemas.microsoft.com/office/powerpoint/2010/main" val="2481473089"/>
+        <p14:creationId xmlns:p14="http://schemas.microsoft.com/office/powerpoint/2010/main" xmlns:p="http://schemas.openxmlformats.org/presentationml/2006/main" xmlns:r="http://schemas.openxmlformats.org/officeDocument/2006/relationships" xmlns:a="http://schemas.openxmlformats.org/drawingml/2006/main" xmlns="" val="2481473089"/>
       </p:ext>
     </p:extLst>
   </p:cSld>
@@ -1405,7 +1418,7 @@
 </file>
 
 <file path=ppt/slideLayouts/slideLayout5.xml><?xml version="1.0" encoding="utf-8"?>
-<p:sldLayout xmlns:a="http://schemas.openxmlformats.org/drawingml/2006/main" xmlns:r="http://schemas.openxmlformats.org/officeDocument/2006/relationships" xmlns:p="http://schemas.openxmlformats.org/presentationml/2006/main" type="twoTxTwoObj" preserve="1">
+<p:sldLayout xmlns:a="http://schemas.openxmlformats.org/drawingml/2006/main" xmlns:r="http://schemas.openxmlformats.org/officeDocument/2006/relationships" xmlns:mc="http://schemas.openxmlformats.org/markup-compatibility/2006" xmlns:mv="urn:schemas-microsoft-com:mac:vml" xmlns:p="http://schemas.openxmlformats.org/presentationml/2006/main" mc:Ignorable="mv" mc:PreserveAttributes="mv:*" type="twoTxTwoObj" preserve="1">
   <p:cSld name="Comparison">
     <p:spTree>
       <p:nvGrpSpPr>
@@ -1765,7 +1778,8 @@
           <a:p>
             <a:fld id="{9AE6FFD7-07CB-4A48-9462-C98F98C8ABDE}" type="datetimeFigureOut">
               <a:rPr lang="en-US" smtClean="0"/>
-              <a:t>11/21/13</a:t>
+              <a:pPr/>
+              <a:t>12/12/13</a:t>
             </a:fld>
             <a:endParaRPr lang="en-US"/>
           </a:p>
@@ -1807,6 +1821,7 @@
           <a:p>
             <a:fld id="{E311C8D0-B88E-954A-8276-0656B5CE616B}" type="slidenum">
               <a:rPr lang="en-US" smtClean="0"/>
+              <a:pPr/>
               <a:t>‹#›</a:t>
             </a:fld>
             <a:endParaRPr lang="en-US"/>
@@ -1816,7 +1831,7 @@
     </p:spTree>
     <p:extLst>
       <p:ext uri="{BB962C8B-B14F-4D97-AF65-F5344CB8AC3E}">
-        <p14:creationId xmlns:p14="http://schemas.microsoft.com/office/powerpoint/2010/main" val="3081072180"/>
+        <p14:creationId xmlns:p14="http://schemas.microsoft.com/office/powerpoint/2010/main" xmlns:p="http://schemas.openxmlformats.org/presentationml/2006/main" xmlns:r="http://schemas.openxmlformats.org/officeDocument/2006/relationships" xmlns:a="http://schemas.openxmlformats.org/drawingml/2006/main" xmlns="" val="3081072180"/>
       </p:ext>
     </p:extLst>
   </p:cSld>
@@ -1827,7 +1842,7 @@
 </file>
 
 <file path=ppt/slideLayouts/slideLayout6.xml><?xml version="1.0" encoding="utf-8"?>
-<p:sldLayout xmlns:a="http://schemas.openxmlformats.org/drawingml/2006/main" xmlns:r="http://schemas.openxmlformats.org/officeDocument/2006/relationships" xmlns:p="http://schemas.openxmlformats.org/presentationml/2006/main" type="titleOnly" preserve="1">
+<p:sldLayout xmlns:a="http://schemas.openxmlformats.org/drawingml/2006/main" xmlns:r="http://schemas.openxmlformats.org/officeDocument/2006/relationships" xmlns:mc="http://schemas.openxmlformats.org/markup-compatibility/2006" xmlns:mv="urn:schemas-microsoft-com:mac:vml" xmlns:p="http://schemas.openxmlformats.org/presentationml/2006/main" mc:Ignorable="mv" mc:PreserveAttributes="mv:*" type="titleOnly" preserve="1">
   <p:cSld name="Title Only">
     <p:spTree>
       <p:nvGrpSpPr>
@@ -1883,7 +1898,8 @@
           <a:p>
             <a:fld id="{9AE6FFD7-07CB-4A48-9462-C98F98C8ABDE}" type="datetimeFigureOut">
               <a:rPr lang="en-US" smtClean="0"/>
-              <a:t>11/21/13</a:t>
+              <a:pPr/>
+              <a:t>12/12/13</a:t>
             </a:fld>
             <a:endParaRPr lang="en-US"/>
           </a:p>
@@ -1925,6 +1941,7 @@
           <a:p>
             <a:fld id="{E311C8D0-B88E-954A-8276-0656B5CE616B}" type="slidenum">
               <a:rPr lang="en-US" smtClean="0"/>
+              <a:pPr/>
               <a:t>‹#›</a:t>
             </a:fld>
             <a:endParaRPr lang="en-US"/>
@@ -1934,7 +1951,7 @@
     </p:spTree>
     <p:extLst>
       <p:ext uri="{BB962C8B-B14F-4D97-AF65-F5344CB8AC3E}">
-        <p14:creationId xmlns:p14="http://schemas.microsoft.com/office/powerpoint/2010/main" val="622186017"/>
+        <p14:creationId xmlns:p14="http://schemas.microsoft.com/office/powerpoint/2010/main" xmlns:p="http://schemas.openxmlformats.org/presentationml/2006/main" xmlns:r="http://schemas.openxmlformats.org/officeDocument/2006/relationships" xmlns:a="http://schemas.openxmlformats.org/drawingml/2006/main" xmlns="" val="622186017"/>
       </p:ext>
     </p:extLst>
   </p:cSld>
@@ -1945,7 +1962,7 @@
 </file>
 
 <file path=ppt/slideLayouts/slideLayout7.xml><?xml version="1.0" encoding="utf-8"?>
-<p:sldLayout xmlns:a="http://schemas.openxmlformats.org/drawingml/2006/main" xmlns:r="http://schemas.openxmlformats.org/officeDocument/2006/relationships" xmlns:p="http://schemas.openxmlformats.org/presentationml/2006/main" type="blank" preserve="1">
+<p:sldLayout xmlns:a="http://schemas.openxmlformats.org/drawingml/2006/main" xmlns:r="http://schemas.openxmlformats.org/officeDocument/2006/relationships" xmlns:mc="http://schemas.openxmlformats.org/markup-compatibility/2006" xmlns:mv="urn:schemas-microsoft-com:mac:vml" xmlns:p="http://schemas.openxmlformats.org/presentationml/2006/main" mc:Ignorable="mv" mc:PreserveAttributes="mv:*" type="blank" preserve="1">
   <p:cSld name="Blank">
     <p:spTree>
       <p:nvGrpSpPr>
@@ -1978,7 +1995,8 @@
           <a:p>
             <a:fld id="{9AE6FFD7-07CB-4A48-9462-C98F98C8ABDE}" type="datetimeFigureOut">
               <a:rPr lang="en-US" smtClean="0"/>
-              <a:t>11/21/13</a:t>
+              <a:pPr/>
+              <a:t>12/12/13</a:t>
             </a:fld>
             <a:endParaRPr lang="en-US"/>
           </a:p>
@@ -2020,6 +2038,7 @@
           <a:p>
             <a:fld id="{E311C8D0-B88E-954A-8276-0656B5CE616B}" type="slidenum">
               <a:rPr lang="en-US" smtClean="0"/>
+              <a:pPr/>
               <a:t>‹#›</a:t>
             </a:fld>
             <a:endParaRPr lang="en-US"/>
@@ -2029,7 +2048,7 @@
     </p:spTree>
     <p:extLst>
       <p:ext uri="{BB962C8B-B14F-4D97-AF65-F5344CB8AC3E}">
-        <p14:creationId xmlns:p14="http://schemas.microsoft.com/office/powerpoint/2010/main" val="611776963"/>
+        <p14:creationId xmlns:p14="http://schemas.microsoft.com/office/powerpoint/2010/main" xmlns:p="http://schemas.openxmlformats.org/presentationml/2006/main" xmlns:r="http://schemas.openxmlformats.org/officeDocument/2006/relationships" xmlns:a="http://schemas.openxmlformats.org/drawingml/2006/main" xmlns="" val="611776963"/>
       </p:ext>
     </p:extLst>
   </p:cSld>
@@ -2040,7 +2059,7 @@
 </file>
 
 <file path=ppt/slideLayouts/slideLayout8.xml><?xml version="1.0" encoding="utf-8"?>
-<p:sldLayout xmlns:a="http://schemas.openxmlformats.org/drawingml/2006/main" xmlns:r="http://schemas.openxmlformats.org/officeDocument/2006/relationships" xmlns:p="http://schemas.openxmlformats.org/presentationml/2006/main" type="objTx" preserve="1">
+<p:sldLayout xmlns:a="http://schemas.openxmlformats.org/drawingml/2006/main" xmlns:r="http://schemas.openxmlformats.org/officeDocument/2006/relationships" xmlns:mc="http://schemas.openxmlformats.org/markup-compatibility/2006" xmlns:mv="urn:schemas-microsoft-com:mac:vml" xmlns:p="http://schemas.openxmlformats.org/presentationml/2006/main" mc:Ignorable="mv" mc:PreserveAttributes="mv:*" type="objTx" preserve="1">
   <p:cSld name="Content with Caption">
     <p:spTree>
       <p:nvGrpSpPr>
@@ -2255,7 +2274,8 @@
           <a:p>
             <a:fld id="{9AE6FFD7-07CB-4A48-9462-C98F98C8ABDE}" type="datetimeFigureOut">
               <a:rPr lang="en-US" smtClean="0"/>
-              <a:t>11/21/13</a:t>
+              <a:pPr/>
+              <a:t>12/12/13</a:t>
             </a:fld>
             <a:endParaRPr lang="en-US"/>
           </a:p>
@@ -2297,6 +2317,7 @@
           <a:p>
             <a:fld id="{E311C8D0-B88E-954A-8276-0656B5CE616B}" type="slidenum">
               <a:rPr lang="en-US" smtClean="0"/>
+              <a:pPr/>
               <a:t>‹#›</a:t>
             </a:fld>
             <a:endParaRPr lang="en-US"/>
@@ -2306,7 +2327,7 @@
     </p:spTree>
     <p:extLst>
       <p:ext uri="{BB962C8B-B14F-4D97-AF65-F5344CB8AC3E}">
-        <p14:creationId xmlns:p14="http://schemas.microsoft.com/office/powerpoint/2010/main" val="2376311031"/>
+        <p14:creationId xmlns:p14="http://schemas.microsoft.com/office/powerpoint/2010/main" xmlns:p="http://schemas.openxmlformats.org/presentationml/2006/main" xmlns:r="http://schemas.openxmlformats.org/officeDocument/2006/relationships" xmlns:a="http://schemas.openxmlformats.org/drawingml/2006/main" xmlns="" val="2376311031"/>
       </p:ext>
     </p:extLst>
   </p:cSld>
@@ -2317,7 +2338,7 @@
 </file>
 
 <file path=ppt/slideLayouts/slideLayout9.xml><?xml version="1.0" encoding="utf-8"?>
-<p:sldLayout xmlns:a="http://schemas.openxmlformats.org/drawingml/2006/main" xmlns:r="http://schemas.openxmlformats.org/officeDocument/2006/relationships" xmlns:p="http://schemas.openxmlformats.org/presentationml/2006/main" type="picTx" preserve="1">
+<p:sldLayout xmlns:a="http://schemas.openxmlformats.org/drawingml/2006/main" xmlns:r="http://schemas.openxmlformats.org/officeDocument/2006/relationships" xmlns:mc="http://schemas.openxmlformats.org/markup-compatibility/2006" xmlns:mv="urn:schemas-microsoft-com:mac:vml" xmlns:p="http://schemas.openxmlformats.org/presentationml/2006/main" mc:Ignorable="mv" mc:PreserveAttributes="mv:*" type="picTx" preserve="1">
   <p:cSld name="Picture with Caption">
     <p:spTree>
       <p:nvGrpSpPr>
@@ -2508,7 +2529,8 @@
           <a:p>
             <a:fld id="{9AE6FFD7-07CB-4A48-9462-C98F98C8ABDE}" type="datetimeFigureOut">
               <a:rPr lang="en-US" smtClean="0"/>
-              <a:t>11/21/13</a:t>
+              <a:pPr/>
+              <a:t>12/12/13</a:t>
             </a:fld>
             <a:endParaRPr lang="en-US"/>
           </a:p>
@@ -2550,6 +2572,7 @@
           <a:p>
             <a:fld id="{E311C8D0-B88E-954A-8276-0656B5CE616B}" type="slidenum">
               <a:rPr lang="en-US" smtClean="0"/>
+              <a:pPr/>
               <a:t>‹#›</a:t>
             </a:fld>
             <a:endParaRPr lang="en-US"/>
@@ -2559,7 +2582,7 @@
     </p:spTree>
     <p:extLst>
       <p:ext uri="{BB962C8B-B14F-4D97-AF65-F5344CB8AC3E}">
-        <p14:creationId xmlns:p14="http://schemas.microsoft.com/office/powerpoint/2010/main" val="3937155813"/>
+        <p14:creationId xmlns:p14="http://schemas.microsoft.com/office/powerpoint/2010/main" xmlns:p="http://schemas.openxmlformats.org/presentationml/2006/main" xmlns:r="http://schemas.openxmlformats.org/officeDocument/2006/relationships" xmlns:a="http://schemas.openxmlformats.org/drawingml/2006/main" xmlns="" val="3937155813"/>
       </p:ext>
     </p:extLst>
   </p:cSld>
@@ -2570,7 +2593,7 @@
 </file>
 
 <file path=ppt/slideMasters/slideMaster1.xml><?xml version="1.0" encoding="utf-8"?>
-<p:sldMaster xmlns:a="http://schemas.openxmlformats.org/drawingml/2006/main" xmlns:r="http://schemas.openxmlformats.org/officeDocument/2006/relationships" xmlns:p="http://schemas.openxmlformats.org/presentationml/2006/main">
+<p:sldMaster xmlns:a="http://schemas.openxmlformats.org/drawingml/2006/main" xmlns:r="http://schemas.openxmlformats.org/officeDocument/2006/relationships" xmlns:mc="http://schemas.openxmlformats.org/markup-compatibility/2006" xmlns:mv="urn:schemas-microsoft-com:mac:vml" xmlns:p="http://schemas.openxmlformats.org/presentationml/2006/main" mc:Ignorable="mv" mc:PreserveAttributes="mv:*">
   <p:cSld>
     <p:bg>
       <p:bgRef idx="1001">
@@ -2721,7 +2744,8 @@
           <a:p>
             <a:fld id="{9AE6FFD7-07CB-4A48-9462-C98F98C8ABDE}" type="datetimeFigureOut">
               <a:rPr lang="en-US" smtClean="0"/>
-              <a:t>11/21/13</a:t>
+              <a:pPr/>
+              <a:t>12/12/13</a:t>
             </a:fld>
             <a:endParaRPr lang="en-US"/>
           </a:p>
@@ -2799,6 +2823,7 @@
           <a:p>
             <a:fld id="{E311C8D0-B88E-954A-8276-0656B5CE616B}" type="slidenum">
               <a:rPr lang="en-US" smtClean="0"/>
+              <a:pPr/>
               <a:t>‹#›</a:t>
             </a:fld>
             <a:endParaRPr lang="en-US"/>
@@ -2808,7 +2833,7 @@
     </p:spTree>
     <p:extLst>
       <p:ext uri="{BB962C8B-B14F-4D97-AF65-F5344CB8AC3E}">
-        <p14:creationId xmlns:p14="http://schemas.microsoft.com/office/powerpoint/2010/main" val="1039503362"/>
+        <p14:creationId xmlns:p14="http://schemas.microsoft.com/office/powerpoint/2010/main" xmlns:p="http://schemas.openxmlformats.org/presentationml/2006/main" xmlns:r="http://schemas.openxmlformats.org/officeDocument/2006/relationships" xmlns:a="http://schemas.openxmlformats.org/drawingml/2006/main" xmlns="" val="1039503362"/>
       </p:ext>
     </p:extLst>
   </p:cSld>
@@ -3080,7 +3105,7 @@
 </file>
 
 <file path=ppt/slides/slide1.xml><?xml version="1.0" encoding="utf-8"?>
-<p:sld xmlns:a="http://schemas.openxmlformats.org/drawingml/2006/main" xmlns:r="http://schemas.openxmlformats.org/officeDocument/2006/relationships" xmlns:p="http://schemas.openxmlformats.org/presentationml/2006/main">
+<p:sld xmlns:a="http://schemas.openxmlformats.org/drawingml/2006/main" xmlns:r="http://schemas.openxmlformats.org/officeDocument/2006/relationships" xmlns:mc="http://schemas.openxmlformats.org/markup-compatibility/2006" xmlns:mv="urn:schemas-microsoft-com:mac:vml" xmlns:p="http://schemas.openxmlformats.org/presentationml/2006/main" mc:Ignorable="mv" mc:PreserveAttributes="mv:*">
   <p:cSld>
     <p:bg>
       <p:bgPr>
@@ -3125,7 +3150,7 @@
           <a:blip r:embed="rId2">
             <a:extLst>
               <a:ext uri="{28A0092B-C50C-407E-A947-70E740481C1C}">
-                <a14:useLocalDpi xmlns:a14="http://schemas.microsoft.com/office/drawing/2010/main" val="0"/>
+                <a14:useLocalDpi xmlns:a14="http://schemas.microsoft.com/office/drawing/2010/main" xmlns:p="http://schemas.openxmlformats.org/presentationml/2006/main" xmlns:r="http://schemas.openxmlformats.org/officeDocument/2006/relationships" xmlns:a="http://schemas.openxmlformats.org/drawingml/2006/main" xmlns="" val="0"/>
               </a:ext>
             </a:extLst>
           </a:blip>
@@ -3155,7 +3180,7 @@
           <a:blip r:embed="rId3">
             <a:extLst>
               <a:ext uri="{28A0092B-C50C-407E-A947-70E740481C1C}">
-                <a14:useLocalDpi xmlns:a14="http://schemas.microsoft.com/office/drawing/2010/main" val="0"/>
+                <a14:useLocalDpi xmlns:a14="http://schemas.microsoft.com/office/drawing/2010/main" xmlns:p="http://schemas.openxmlformats.org/presentationml/2006/main" xmlns:r="http://schemas.openxmlformats.org/officeDocument/2006/relationships" xmlns:a="http://schemas.openxmlformats.org/drawingml/2006/main" xmlns="" val="0"/>
               </a:ext>
             </a:extLst>
           </a:blip>
@@ -3185,7 +3210,7 @@
           <a:blip r:embed="rId4">
             <a:extLst>
               <a:ext uri="{28A0092B-C50C-407E-A947-70E740481C1C}">
-                <a14:useLocalDpi xmlns:a14="http://schemas.microsoft.com/office/drawing/2010/main" val="0"/>
+                <a14:useLocalDpi xmlns:a14="http://schemas.microsoft.com/office/drawing/2010/main" xmlns:p="http://schemas.openxmlformats.org/presentationml/2006/main" xmlns:r="http://schemas.openxmlformats.org/officeDocument/2006/relationships" xmlns:a="http://schemas.openxmlformats.org/drawingml/2006/main" xmlns="" val="0"/>
               </a:ext>
             </a:extLst>
           </a:blip>
@@ -3282,7 +3307,7 @@
     </p:spTree>
     <p:extLst>
       <p:ext uri="{BB962C8B-B14F-4D97-AF65-F5344CB8AC3E}">
-        <p14:creationId xmlns:p14="http://schemas.microsoft.com/office/powerpoint/2010/main" val="300078944"/>
+        <p14:creationId xmlns:p14="http://schemas.microsoft.com/office/powerpoint/2010/main" xmlns:p="http://schemas.openxmlformats.org/presentationml/2006/main" xmlns:r="http://schemas.openxmlformats.org/officeDocument/2006/relationships" xmlns:a="http://schemas.openxmlformats.org/drawingml/2006/main" xmlns="" val="300078944"/>
       </p:ext>
     </p:extLst>
   </p:cSld>
@@ -3292,7 +3317,7 @@
   <p:timing>
     <p:tnLst>
       <p:par>
-        <p:cTn xmlns:p14="http://schemas.microsoft.com/office/powerpoint/2010/main" id="1" dur="indefinite" restart="never" nodeType="tmRoot"/>
+        <p:cTn id="1" dur="indefinite" restart="never" nodeType="tmRoot"/>
       </p:par>
     </p:tnLst>
   </p:timing>
@@ -3300,7 +3325,7 @@
 </file>
 
 <file path=ppt/slides/slide2.xml><?xml version="1.0" encoding="utf-8"?>
-<p:sld xmlns:a="http://schemas.openxmlformats.org/drawingml/2006/main" xmlns:r="http://schemas.openxmlformats.org/officeDocument/2006/relationships" xmlns:p="http://schemas.openxmlformats.org/presentationml/2006/main">
+<p:sld xmlns:a="http://schemas.openxmlformats.org/drawingml/2006/main" xmlns:r="http://schemas.openxmlformats.org/officeDocument/2006/relationships" xmlns:mc="http://schemas.openxmlformats.org/markup-compatibility/2006" xmlns:mv="urn:schemas-microsoft-com:mac:vml" xmlns:p="http://schemas.openxmlformats.org/presentationml/2006/main" mc:Ignorable="mv" mc:PreserveAttributes="mv:*">
   <p:cSld>
     <p:bg>
       <p:bgPr>
@@ -3345,7 +3370,7 @@
           <a:blip r:embed="rId2">
             <a:extLst>
               <a:ext uri="{28A0092B-C50C-407E-A947-70E740481C1C}">
-                <a14:useLocalDpi xmlns:a14="http://schemas.microsoft.com/office/drawing/2010/main" val="0"/>
+                <a14:useLocalDpi xmlns:a14="http://schemas.microsoft.com/office/drawing/2010/main" xmlns:p="http://schemas.openxmlformats.org/presentationml/2006/main" xmlns:r="http://schemas.openxmlformats.org/officeDocument/2006/relationships" xmlns:a="http://schemas.openxmlformats.org/drawingml/2006/main" xmlns="" val="0"/>
               </a:ext>
             </a:extLst>
           </a:blip>
@@ -3437,7 +3462,7 @@
     </p:spTree>
     <p:extLst>
       <p:ext uri="{BB962C8B-B14F-4D97-AF65-F5344CB8AC3E}">
-        <p14:creationId xmlns:p14="http://schemas.microsoft.com/office/powerpoint/2010/main" val="3368557109"/>
+        <p14:creationId xmlns:p14="http://schemas.microsoft.com/office/powerpoint/2010/main" xmlns:p="http://schemas.openxmlformats.org/presentationml/2006/main" xmlns:r="http://schemas.openxmlformats.org/officeDocument/2006/relationships" xmlns:a="http://schemas.openxmlformats.org/drawingml/2006/main" xmlns="" val="3368557109"/>
       </p:ext>
     </p:extLst>
   </p:cSld>
@@ -3447,10 +3472,169 @@
   <p:timing>
     <p:tnLst>
       <p:par>
-        <p:cTn xmlns:p14="http://schemas.microsoft.com/office/powerpoint/2010/main" id="1" dur="indefinite" restart="never" nodeType="tmRoot"/>
+        <p:cTn id="1" dur="indefinite" restart="never" nodeType="tmRoot"/>
       </p:par>
     </p:tnLst>
   </p:timing>
+</p:sld>
+</file>
+
+<file path=ppt/slides/slide3.xml><?xml version="1.0" encoding="utf-8"?>
+<p:sld xmlns:a="http://schemas.openxmlformats.org/drawingml/2006/main" xmlns:r="http://schemas.openxmlformats.org/officeDocument/2006/relationships" xmlns:mc="http://schemas.openxmlformats.org/markup-compatibility/2006" xmlns:mv="urn:schemas-microsoft-com:mac:vml" xmlns:p="http://schemas.openxmlformats.org/presentationml/2006/main" mc:Ignorable="mv" mc:PreserveAttributes="mv:*">
+  <p:cSld>
+    <p:bg>
+      <p:bgPr>
+        <a:gradFill flip="none" rotWithShape="1">
+          <a:gsLst>
+            <a:gs pos="0">
+              <a:schemeClr val="bg1"/>
+            </a:gs>
+            <a:gs pos="100000">
+              <a:srgbClr val="000000"/>
+            </a:gs>
+          </a:gsLst>
+          <a:lin ang="5160000" scaled="0"/>
+          <a:tileRect/>
+        </a:gradFill>
+        <a:effectLst/>
+      </p:bgPr>
+    </p:bg>
+    <p:spTree>
+      <p:nvGrpSpPr>
+        <p:cNvPr id="1" name=""/>
+        <p:cNvGrpSpPr/>
+        <p:nvPr/>
+      </p:nvGrpSpPr>
+      <p:grpSpPr>
+        <a:xfrm>
+          <a:off x="0" y="0"/>
+          <a:ext cx="0" cy="0"/>
+          <a:chOff x="0" y="0"/>
+          <a:chExt cx="0" cy="0"/>
+        </a:xfrm>
+      </p:grpSpPr>
+      <p:pic>
+        <p:nvPicPr>
+          <p:cNvPr id="5" name="Picture 4" descr="Drawer_2.png"/>
+          <p:cNvPicPr>
+            <a:picLocks noChangeAspect="1"/>
+          </p:cNvPicPr>
+          <p:nvPr/>
+        </p:nvPicPr>
+        <p:blipFill>
+          <a:blip r:embed="rId2"/>
+          <a:stretch>
+            <a:fillRect/>
+          </a:stretch>
+        </p:blipFill>
+        <p:spPr>
+          <a:xfrm>
+            <a:off x="5315825" y="946331"/>
+            <a:ext cx="2390537" cy="4565483"/>
+          </a:xfrm>
+          <a:prstGeom prst="rect">
+            <a:avLst/>
+          </a:prstGeom>
+        </p:spPr>
+      </p:pic>
+      <p:pic>
+        <p:nvPicPr>
+          <p:cNvPr id="6" name="Picture 5" descr="Drawer_1.png"/>
+          <p:cNvPicPr>
+            <a:picLocks noChangeAspect="1"/>
+          </p:cNvPicPr>
+          <p:nvPr/>
+        </p:nvPicPr>
+        <p:blipFill>
+          <a:blip r:embed="rId3"/>
+          <a:stretch>
+            <a:fillRect/>
+          </a:stretch>
+        </p:blipFill>
+        <p:spPr>
+          <a:xfrm>
+            <a:off x="1524305" y="946332"/>
+            <a:ext cx="2390537" cy="4565482"/>
+          </a:xfrm>
+          <a:prstGeom prst="rect">
+            <a:avLst/>
+          </a:prstGeom>
+        </p:spPr>
+      </p:pic>
+      <p:sp>
+        <p:nvSpPr>
+          <p:cNvPr id="7" name="Oval 6"/>
+          <p:cNvSpPr/>
+          <p:nvPr/>
+        </p:nvSpPr>
+        <p:spPr>
+          <a:xfrm>
+            <a:off x="1659464" y="2929473"/>
+            <a:ext cx="296340" cy="313273"/>
+          </a:xfrm>
+          <a:prstGeom prst="ellipse">
+            <a:avLst/>
+          </a:prstGeom>
+        </p:spPr>
+        <p:style>
+          <a:lnRef idx="1">
+            <a:schemeClr val="accent1"/>
+          </a:lnRef>
+          <a:fillRef idx="3">
+            <a:schemeClr val="accent1"/>
+          </a:fillRef>
+          <a:effectRef idx="2">
+            <a:schemeClr val="accent1"/>
+          </a:effectRef>
+          <a:fontRef idx="minor">
+            <a:schemeClr val="lt1"/>
+          </a:fontRef>
+        </p:style>
+        <p:txBody>
+          <a:bodyPr rtlCol="0" anchor="ctr"/>
+          <a:lstStyle/>
+          <a:p>
+            <a:pPr algn="ctr"/>
+            <a:endParaRPr lang="en-US"/>
+          </a:p>
+        </p:txBody>
+      </p:sp>
+      <p:sp>
+        <p:nvSpPr>
+          <p:cNvPr id="8" name="Right Arrow 7"/>
+          <p:cNvSpPr/>
+          <p:nvPr/>
+        </p:nvSpPr>
+        <p:spPr>
+          <a:xfrm>
+            <a:off x="2294465" y="2814337"/>
+            <a:ext cx="3004426" cy="521546"/>
+          </a:xfrm>
+          <a:prstGeom prst="rightArrow">
+            <a:avLst/>
+          </a:prstGeom>
+          <a:ln/>
+        </p:spPr>
+        <p:style>
+          <a:lnRef idx="1">
+            <a:schemeClr val="accent1"/>
+          </a:lnRef>
+          <a:fillRef idx="3">
+            <a:schemeClr val="accent1"/>
+          </a:fillRef>
+          <a:effectRef idx="2">
+            <a:schemeClr val="accent1"/>
+          </a:effectRef>
+          <a:fontRef idx="minor">
+            <a:schemeClr val="lt1"/>
+          </a:fontRef>
+        </p:style>
+      </p:sp>
+    </p:spTree>
+  </p:cSld>
+  <p:clrMapOvr>
+    <a:masterClrMapping/>
+  </p:clrMapOvr>
 </p:sld>
 </file>
 

</xml_diff>